<commit_message>
Änderung von git diff --cached auf git diff --staged
</commit_message>
<xml_diff>
--- a/presentation/Git Grundlagen.pptx
+++ b/presentation/Git Grundlagen.pptx
@@ -388,7 +388,7 @@
                   <a:schemeClr val="tx2"/>
                 </a:solidFill>
               </a:rPr>
-              <a:t>20.10.2020</a:t>
+              <a:t>17.03.2021</a:t>
             </a:fld>
             <a:endParaRPr lang="de-DE">
               <a:solidFill>
@@ -738,7 +738,7 @@
             <a:fld id="{B4113CCE-1A1A-46DB-884A-AE560F65C3AF}" type="datetimeFigureOut">
               <a:rPr lang="de-DE" smtClean="0"/>
               <a:pPr/>
-              <a:t>20.10.2020</a:t>
+              <a:t>17.03.2021</a:t>
             </a:fld>
             <a:endParaRPr lang="de-DE"/>
           </a:p>
@@ -3688,7 +3688,7 @@
             </a:r>
             <a:r>
               <a:rPr lang="de-DE" baseline="0" dirty="0" err="1"/>
-              <a:t>cached</a:t>
+              <a:t>staged</a:t>
             </a:r>
             <a:r>
               <a:rPr lang="de-DE" baseline="0" dirty="0"/>
@@ -4605,7 +4605,7 @@
             </a:r>
             <a:r>
               <a:rPr lang="de-DE" baseline="0" dirty="0" err="1"/>
-              <a:t>cached</a:t>
+              <a:t>staged</a:t>
             </a:r>
             <a:r>
               <a:rPr lang="de-DE" baseline="0" dirty="0"/>
@@ -6952,7 +6952,7 @@
           <a:p>
             <a:fld id="{CAAC9B9F-4667-4144-BE25-538278C9F7BA}" type="datetime1">
               <a:rPr lang="de-DE" smtClean="0"/>
-              <a:t>20.10.2020</a:t>
+              <a:t>17.03.2021</a:t>
             </a:fld>
             <a:endParaRPr lang="de-DE"/>
           </a:p>
@@ -7157,7 +7157,7 @@
           <a:p>
             <a:fld id="{55CF7B08-6172-4F18-B301-458977AB4D4C}" type="datetime1">
               <a:rPr lang="de-DE" smtClean="0"/>
-              <a:t>20.10.2020</a:t>
+              <a:t>17.03.2021</a:t>
             </a:fld>
             <a:endParaRPr lang="de-DE"/>
           </a:p>
@@ -7311,7 +7311,7 @@
           <a:p>
             <a:fld id="{AF27B489-7465-43F0-8090-5F63B6A8CEBC}" type="datetime1">
               <a:rPr lang="de-DE" smtClean="0"/>
-              <a:t>20.10.2020</a:t>
+              <a:t>17.03.2021</a:t>
             </a:fld>
             <a:endParaRPr lang="de-DE"/>
           </a:p>
@@ -7548,7 +7548,7 @@
           <a:p>
             <a:fld id="{C06F0C7A-537B-4680-970F-099894853C62}" type="datetime1">
               <a:rPr lang="de-DE" smtClean="0"/>
-              <a:t>20.10.2020</a:t>
+              <a:t>17.03.2021</a:t>
             </a:fld>
             <a:endParaRPr lang="de-DE"/>
           </a:p>
@@ -7724,7 +7724,7 @@
           <a:p>
             <a:fld id="{A15FEB95-FD04-4942-8AC0-4CEE8A1910E0}" type="datetime1">
               <a:rPr lang="de-DE" smtClean="0"/>
-              <a:t>20.10.2020</a:t>
+              <a:t>17.03.2021</a:t>
             </a:fld>
             <a:endParaRPr lang="de-DE"/>
           </a:p>
@@ -7900,7 +7900,7 @@
           <a:p>
             <a:fld id="{B355EDB0-77CD-4224-B690-72579E113DA5}" type="datetime1">
               <a:rPr lang="de-DE" smtClean="0"/>
-              <a:t>20.10.2020</a:t>
+              <a:t>17.03.2021</a:t>
             </a:fld>
             <a:endParaRPr lang="de-DE"/>
           </a:p>
@@ -8050,7 +8050,7 @@
           <a:p>
             <a:fld id="{504D06AA-CE86-43E4-8179-4FCC50AD1D8E}" type="datetime1">
               <a:rPr lang="de-DE" smtClean="0"/>
-              <a:t>20.10.2020</a:t>
+              <a:t>17.03.2021</a:t>
             </a:fld>
             <a:endParaRPr lang="de-DE"/>
           </a:p>
@@ -8148,7 +8148,7 @@
           <a:p>
             <a:fld id="{EC9960FD-384B-4EC9-8273-C333CC776452}" type="datetime1">
               <a:rPr lang="de-DE" smtClean="0"/>
-              <a:t>20.10.2020</a:t>
+              <a:t>17.03.2021</a:t>
             </a:fld>
             <a:endParaRPr lang="de-DE"/>
           </a:p>
@@ -8272,7 +8272,7 @@
           <a:p>
             <a:fld id="{93F9273C-81C2-4A47-984E-C054C4BD8602}" type="datetime1">
               <a:rPr lang="de-DE" smtClean="0"/>
-              <a:t>20.10.2020</a:t>
+              <a:t>17.03.2021</a:t>
             </a:fld>
             <a:endParaRPr lang="de-DE"/>
           </a:p>
@@ -8456,7 +8456,7 @@
           <a:p>
             <a:fld id="{82FA0F21-5DEC-4F55-92AB-1B44A80CCCA8}" type="datetime1">
               <a:rPr lang="de-DE" smtClean="0"/>
-              <a:t>20.10.2020</a:t>
+              <a:t>17.03.2021</a:t>
             </a:fld>
             <a:endParaRPr lang="de-DE"/>
           </a:p>
@@ -8661,7 +8661,7 @@
           <a:p>
             <a:fld id="{FE8C38D4-9C09-45A6-8823-88A25D2D7D66}" type="datetime1">
               <a:rPr lang="de-DE" smtClean="0"/>
-              <a:t>20.10.2020</a:t>
+              <a:t>17.03.2021</a:t>
             </a:fld>
             <a:endParaRPr lang="de-DE"/>
           </a:p>
@@ -9019,7 +9019,7 @@
           <a:p>
             <a:fld id="{C6D545D1-DF18-473E-919E-FDEEF30A3AEC}" type="datetime1">
               <a:rPr lang="de-DE" smtClean="0"/>
-              <a:t>20.10.2020</a:t>
+              <a:t>17.03.2021</a:t>
             </a:fld>
             <a:endParaRPr lang="de-DE" dirty="0"/>
           </a:p>
@@ -9660,7 +9660,7 @@
           <a:p>
             <a:fld id="{CAA4A97F-5067-422C-8457-56EF766A6B31}" type="datetime1">
               <a:rPr lang="de-DE" smtClean="0"/>
-              <a:t>20.10.2020</a:t>
+              <a:t>17.03.2021</a:t>
             </a:fld>
             <a:endParaRPr lang="de-DE" dirty="0"/>
           </a:p>
@@ -10285,7 +10285,7 @@
           <a:p>
             <a:fld id="{13018085-D8F8-4625-81EC-ABE2B2865DA9}" type="datetime1">
               <a:rPr lang="de-DE" smtClean="0"/>
-              <a:t>20.10.2020</a:t>
+              <a:t>17.03.2021</a:t>
             </a:fld>
             <a:endParaRPr lang="de-DE"/>
           </a:p>
@@ -10476,7 +10476,7 @@
           <a:p>
             <a:fld id="{A4FC1D7E-713D-44DB-95A5-98557D0BF5B9}" type="datetime1">
               <a:rPr lang="de-DE" smtClean="0"/>
-              <a:t>20.10.2020</a:t>
+              <a:t>17.03.2021</a:t>
             </a:fld>
             <a:endParaRPr lang="de-DE"/>
           </a:p>
@@ -10647,7 +10647,7 @@
           <a:p>
             <a:fld id="{3D0AE52B-234C-490E-91A9-FC5591DDA8EB}" type="datetime1">
               <a:rPr lang="de-DE" smtClean="0"/>
-              <a:t>20.10.2020</a:t>
+              <a:t>17.03.2021</a:t>
             </a:fld>
             <a:endParaRPr lang="de-DE"/>
           </a:p>
@@ -11138,7 +11138,7 @@
           <a:p>
             <a:fld id="{EF4679E0-C6A5-4715-905D-E92279C178ED}" type="datetime1">
               <a:rPr lang="de-DE" smtClean="0"/>
-              <a:t>20.10.2020</a:t>
+              <a:t>17.03.2021</a:t>
             </a:fld>
             <a:endParaRPr lang="de-DE"/>
           </a:p>
@@ -11588,7 +11588,7 @@
           <a:p>
             <a:fld id="{D037337C-91B2-4F80-BB30-8F989B2DAF27}" type="datetime1">
               <a:rPr lang="de-DE" smtClean="0"/>
-              <a:t>20.10.2020</a:t>
+              <a:t>17.03.2021</a:t>
             </a:fld>
             <a:endParaRPr lang="de-DE"/>
           </a:p>
@@ -11768,7 +11768,7 @@
           <a:p>
             <a:fld id="{A15FEB95-FD04-4942-8AC0-4CEE8A1910E0}" type="datetime1">
               <a:rPr lang="de-DE" smtClean="0"/>
-              <a:t>20.10.2020</a:t>
+              <a:t>17.03.2021</a:t>
             </a:fld>
             <a:endParaRPr lang="de-DE"/>
           </a:p>
@@ -12118,7 +12118,7 @@
           <a:p>
             <a:fld id="{61A4EDA3-B541-4210-9983-BA70BA58C31B}" type="datetime1">
               <a:rPr lang="de-DE" smtClean="0"/>
-              <a:t>20.10.2020</a:t>
+              <a:t>17.03.2021</a:t>
             </a:fld>
             <a:endParaRPr lang="de-DE"/>
           </a:p>
@@ -12480,7 +12480,7 @@
           <a:p>
             <a:fld id="{A15FEB95-FD04-4942-8AC0-4CEE8A1910E0}" type="datetime1">
               <a:rPr lang="de-DE" smtClean="0"/>
-              <a:t>20.10.2020</a:t>
+              <a:t>17.03.2021</a:t>
             </a:fld>
             <a:endParaRPr lang="de-DE"/>
           </a:p>
@@ -13068,7 +13068,7 @@
           <a:p>
             <a:fld id="{8285FBC6-46F6-415A-9AB8-499412E086FB}" type="datetime1">
               <a:rPr lang="de-DE" smtClean="0"/>
-              <a:t>20.10.2020</a:t>
+              <a:t>17.03.2021</a:t>
             </a:fld>
             <a:endParaRPr lang="de-DE"/>
           </a:p>
@@ -13433,61 +13433,25 @@
                 </a:solidFill>
                 <a:latin typeface="Source Code Pro" panose="020B0509030403020204" pitchFamily="49" charset="0"/>
               </a:rPr>
-              <a:t>"</a:t>
+              <a:t>"/</a:t>
+            </a:r>
+            <a:r>
+              <a:rPr lang="de-DE" sz="2400" dirty="0" err="1">
+                <a:solidFill>
+                  <a:srgbClr val="00B050"/>
+                </a:solidFill>
+                <a:latin typeface="Source Code Pro" panose="020B0509030403020204" pitchFamily="49" charset="0"/>
+              </a:rPr>
+              <a:t>usr</a:t>
             </a:r>
             <a:r>
               <a:rPr lang="de-DE" sz="2400" dirty="0">
                 <a:solidFill>
-                  <a:srgbClr val="C00000"/>
-                </a:solidFill>
-                <a:latin typeface="Source Code Pro" panose="020B0509030403020204" pitchFamily="49" charset="0"/>
-              </a:rPr>
-              <a:t>\"</a:t>
-            </a:r>
-            <a:r>
-              <a:rPr lang="de-DE" sz="2400" dirty="0">
-                <a:solidFill>
-                  <a:srgbClr val="00B050"/>
-                </a:solidFill>
-                <a:latin typeface="Source Code Pro" panose="020B0509030403020204" pitchFamily="49" charset="0"/>
-              </a:rPr>
-              <a:t>/</a:t>
-            </a:r>
-            <a:r>
-              <a:rPr lang="de-DE" sz="2400" dirty="0" err="1">
-                <a:solidFill>
-                  <a:srgbClr val="00B050"/>
-                </a:solidFill>
-                <a:latin typeface="Source Code Pro" panose="020B0509030403020204" pitchFamily="49" charset="0"/>
-              </a:rPr>
-              <a:t>usr</a:t>
-            </a:r>
-            <a:r>
-              <a:rPr lang="de-DE" sz="2400" dirty="0">
-                <a:solidFill>
-                  <a:srgbClr val="00B050"/>
-                </a:solidFill>
-                <a:latin typeface="Source Code Pro" panose="020B0509030403020204" pitchFamily="49" charset="0"/>
-              </a:rPr>
-              <a:t>/bin/kdiff3</a:t>
-            </a:r>
-            <a:r>
-              <a:rPr lang="de-DE" sz="2400" dirty="0">
-                <a:solidFill>
-                  <a:srgbClr val="C00000"/>
-                </a:solidFill>
-                <a:latin typeface="Source Code Pro" panose="020B0509030403020204" pitchFamily="49" charset="0"/>
-              </a:rPr>
-              <a:t>\"</a:t>
-            </a:r>
-            <a:r>
-              <a:rPr lang="de-DE" sz="2400" dirty="0">
-                <a:solidFill>
-                  <a:srgbClr val="00B050"/>
-                </a:solidFill>
-                <a:latin typeface="Source Code Pro" panose="020B0509030403020204" pitchFamily="49" charset="0"/>
-              </a:rPr>
-              <a:t> </a:t>
+                  <a:srgbClr val="00B050"/>
+                </a:solidFill>
+                <a:latin typeface="Source Code Pro" panose="020B0509030403020204" pitchFamily="49" charset="0"/>
+              </a:rPr>
+              <a:t>/bin/kdiff3 </a:t>
             </a:r>
             <a:r>
               <a:rPr lang="de-DE" sz="2400" dirty="0">
@@ -13605,7 +13569,7 @@
           <a:p>
             <a:fld id="{8285FBC6-46F6-415A-9AB8-499412E086FB}" type="datetime1">
               <a:rPr lang="de-DE" smtClean="0"/>
-              <a:t>20.10.2020</a:t>
+              <a:t>17.03.2021</a:t>
             </a:fld>
             <a:endParaRPr lang="de-DE"/>
           </a:p>
@@ -14103,7 +14067,7 @@
           <a:p>
             <a:fld id="{92D62974-E87E-46FB-A94F-3530076D48C8}" type="datetime1">
               <a:rPr lang="de-DE" smtClean="0"/>
-              <a:t>20.10.2020</a:t>
+              <a:t>17.03.2021</a:t>
             </a:fld>
             <a:endParaRPr lang="de-DE"/>
           </a:p>
@@ -14256,7 +14220,7 @@
           <a:p>
             <a:fld id="{F84BBB06-895A-4573-A992-176A4B812352}" type="datetime1">
               <a:rPr lang="de-DE" smtClean="0"/>
-              <a:t>20.10.2020</a:t>
+              <a:t>17.03.2021</a:t>
             </a:fld>
             <a:endParaRPr lang="de-DE"/>
           </a:p>
@@ -14433,7 +14397,7 @@
           <a:p>
             <a:fld id="{CD4C6F65-6539-47A6-99A1-E443EB27B69A}" type="datetime1">
               <a:rPr lang="de-DE" smtClean="0"/>
-              <a:t>20.10.2020</a:t>
+              <a:t>17.03.2021</a:t>
             </a:fld>
             <a:endParaRPr lang="de-DE"/>
           </a:p>
@@ -14777,7 +14741,7 @@
           <a:p>
             <a:fld id="{5AAE56B1-84EA-412D-8AFF-233707D4049C}" type="datetime1">
               <a:rPr lang="de-DE" smtClean="0"/>
-              <a:t>20.10.2020</a:t>
+              <a:t>17.03.2021</a:t>
             </a:fld>
             <a:endParaRPr lang="de-DE"/>
           </a:p>
@@ -14994,7 +14958,7 @@
           <a:p>
             <a:fld id="{609BD242-27DC-4855-ABEC-C718F9B6C14F}" type="datetime1">
               <a:rPr lang="de-DE" smtClean="0"/>
-              <a:t>20.10.2020</a:t>
+              <a:t>17.03.2021</a:t>
             </a:fld>
             <a:endParaRPr lang="de-DE"/>
           </a:p>
@@ -15260,7 +15224,7 @@
           <a:p>
             <a:fld id="{A15FEB95-FD04-4942-8AC0-4CEE8A1910E0}" type="datetime1">
               <a:rPr lang="de-DE" smtClean="0"/>
-              <a:t>20.10.2020</a:t>
+              <a:t>17.03.2021</a:t>
             </a:fld>
             <a:endParaRPr lang="de-DE"/>
           </a:p>
@@ -15472,7 +15436,7 @@
           <a:p>
             <a:fld id="{315423C5-BAB4-458A-84F3-45201C34F403}" type="datetime1">
               <a:rPr lang="de-DE" smtClean="0"/>
-              <a:t>20.10.2020</a:t>
+              <a:t>17.03.2021</a:t>
             </a:fld>
             <a:endParaRPr lang="de-DE"/>
           </a:p>
@@ -15689,7 +15653,7 @@
           <a:p>
             <a:fld id="{455DBEA4-8078-44CA-A561-8D56D63FA15F}" type="datetime1">
               <a:rPr lang="de-DE" smtClean="0"/>
-              <a:t>20.10.2020</a:t>
+              <a:t>17.03.2021</a:t>
             </a:fld>
             <a:endParaRPr lang="de-DE"/>
           </a:p>
@@ -15955,7 +15919,7 @@
           <a:p>
             <a:fld id="{A15FEB95-FD04-4942-8AC0-4CEE8A1910E0}" type="datetime1">
               <a:rPr lang="de-DE" smtClean="0"/>
-              <a:t>20.10.2020</a:t>
+              <a:t>17.03.2021</a:t>
             </a:fld>
             <a:endParaRPr lang="de-DE"/>
           </a:p>
@@ -16269,7 +16233,7 @@
           <a:p>
             <a:fld id="{A29F25F3-02B9-461D-8317-5C10B7645C2A}" type="datetime1">
               <a:rPr lang="de-DE" smtClean="0"/>
-              <a:t>20.10.2020</a:t>
+              <a:t>17.03.2021</a:t>
             </a:fld>
             <a:endParaRPr lang="de-DE"/>
           </a:p>
@@ -16486,7 +16450,7 @@
           <a:p>
             <a:fld id="{22EAAF36-8B5F-4092-A7C9-849D59473292}" type="datetime1">
               <a:rPr lang="de-DE" smtClean="0"/>
-              <a:t>20.10.2020</a:t>
+              <a:t>17.03.2021</a:t>
             </a:fld>
             <a:endParaRPr lang="de-DE"/>
           </a:p>
@@ -16747,6 +16711,41 @@
                 </a:solidFill>
                 <a:latin typeface="Source Code Pro" panose="020B0509030403020204" pitchFamily="49" charset="0"/>
               </a:rPr>
+              <a:t>status</a:t>
+            </a:r>
+            <a:endParaRPr lang="de-DE" dirty="0">
+              <a:solidFill>
+                <a:srgbClr val="00B050"/>
+              </a:solidFill>
+              <a:latin typeface="Source Code Pro" panose="020B0509030403020204" pitchFamily="49" charset="0"/>
+            </a:endParaRPr>
+          </a:p>
+          <a:p>
+            <a:r>
+              <a:rPr lang="de-DE" dirty="0" err="1">
+                <a:solidFill>
+                  <a:srgbClr val="00B050"/>
+                </a:solidFill>
+                <a:latin typeface="Source Code Pro" panose="020B0509030403020204" pitchFamily="49" charset="0"/>
+              </a:rPr>
+              <a:t>git</a:t>
+            </a:r>
+            <a:r>
+              <a:rPr lang="de-DE" dirty="0">
+                <a:solidFill>
+                  <a:srgbClr val="00B050"/>
+                </a:solidFill>
+                <a:latin typeface="Source Code Pro" panose="020B0509030403020204" pitchFamily="49" charset="0"/>
+              </a:rPr>
+              <a:t> </a:t>
+            </a:r>
+            <a:r>
+              <a:rPr lang="de-DE" dirty="0" err="1">
+                <a:solidFill>
+                  <a:srgbClr val="00B050"/>
+                </a:solidFill>
+                <a:latin typeface="Source Code Pro" panose="020B0509030403020204" pitchFamily="49" charset="0"/>
+              </a:rPr>
               <a:t>checkout</a:t>
             </a:r>
             <a:r>
@@ -16778,6 +16777,41 @@
               </a:rPr>
               <a:t> test.txt</a:t>
             </a:r>
+          </a:p>
+          <a:p>
+            <a:r>
+              <a:rPr lang="de-DE" dirty="0" err="1">
+                <a:solidFill>
+                  <a:srgbClr val="00B050"/>
+                </a:solidFill>
+                <a:latin typeface="Source Code Pro" panose="020B0509030403020204" pitchFamily="49" charset="0"/>
+              </a:rPr>
+              <a:t>git</a:t>
+            </a:r>
+            <a:r>
+              <a:rPr lang="de-DE" dirty="0">
+                <a:solidFill>
+                  <a:srgbClr val="00B050"/>
+                </a:solidFill>
+                <a:latin typeface="Source Code Pro" panose="020B0509030403020204" pitchFamily="49" charset="0"/>
+              </a:rPr>
+              <a:t> </a:t>
+            </a:r>
+            <a:r>
+              <a:rPr lang="de-DE" dirty="0" err="1">
+                <a:solidFill>
+                  <a:srgbClr val="00B050"/>
+                </a:solidFill>
+                <a:latin typeface="Source Code Pro" panose="020B0509030403020204" pitchFamily="49" charset="0"/>
+              </a:rPr>
+              <a:t>status</a:t>
+            </a:r>
+            <a:endParaRPr lang="de-DE" dirty="0">
+              <a:solidFill>
+                <a:srgbClr val="00B050"/>
+              </a:solidFill>
+              <a:latin typeface="Source Code Pro" panose="020B0509030403020204" pitchFamily="49" charset="0"/>
+            </a:endParaRPr>
           </a:p>
         </p:txBody>
       </p:sp>
@@ -16798,7 +16832,7 @@
           <a:p>
             <a:fld id="{A15FEB95-FD04-4942-8AC0-4CEE8A1910E0}" type="datetime1">
               <a:rPr lang="de-DE" smtClean="0"/>
-              <a:t>20.10.2020</a:t>
+              <a:t>17.03.2021</a:t>
             </a:fld>
             <a:endParaRPr lang="de-DE"/>
           </a:p>
@@ -17018,7 +17052,7 @@
           <a:p>
             <a:fld id="{7449B873-D03E-4351-A939-BB03A372F070}" type="datetime1">
               <a:rPr lang="de-DE" smtClean="0"/>
-              <a:t>20.10.2020</a:t>
+              <a:t>17.03.2021</a:t>
             </a:fld>
             <a:endParaRPr lang="de-DE"/>
           </a:p>
@@ -17286,7 +17320,7 @@
           <a:p>
             <a:fld id="{B735FF3C-5636-43C7-9EE9-F2E964C8C4AA}" type="datetime1">
               <a:rPr lang="de-DE" smtClean="0"/>
-              <a:t>20.10.2020</a:t>
+              <a:t>17.03.2021</a:t>
             </a:fld>
             <a:endParaRPr lang="de-DE"/>
           </a:p>
@@ -17491,7 +17525,7 @@
           <a:p>
             <a:fld id="{A8B76AEA-B368-4EF0-B667-27D0210C5F9B}" type="datetime1">
               <a:rPr lang="de-DE" smtClean="0"/>
-              <a:t>20.10.2020</a:t>
+              <a:t>17.03.2021</a:t>
             </a:fld>
             <a:endParaRPr lang="de-DE"/>
           </a:p>
@@ -17827,7 +17861,7 @@
           <a:p>
             <a:fld id="{A15FEB95-FD04-4942-8AC0-4CEE8A1910E0}" type="datetime1">
               <a:rPr lang="de-DE" smtClean="0"/>
-              <a:t>20.10.2020</a:t>
+              <a:t>17.03.2021</a:t>
             </a:fld>
             <a:endParaRPr lang="de-DE"/>
           </a:p>
@@ -18109,7 +18143,7 @@
           <a:p>
             <a:fld id="{A15FEB95-FD04-4942-8AC0-4CEE8A1910E0}" type="datetime1">
               <a:rPr lang="de-DE" smtClean="0"/>
-              <a:t>20.10.2020</a:t>
+              <a:t>17.03.2021</a:t>
             </a:fld>
             <a:endParaRPr lang="de-DE"/>
           </a:p>
@@ -18309,7 +18343,7 @@
           <a:p>
             <a:fld id="{2E0DF700-EFD0-4153-9B0B-49EDDEBC0D45}" type="datetime1">
               <a:rPr lang="de-DE" smtClean="0"/>
-              <a:t>20.10.2020</a:t>
+              <a:t>17.03.2021</a:t>
             </a:fld>
             <a:endParaRPr lang="de-DE"/>
           </a:p>
@@ -18477,7 +18511,7 @@
                 </a:solidFill>
                 <a:latin typeface="Source Code Pro" panose="020B0509030403020204" pitchFamily="49" charset="0"/>
               </a:rPr>
-              <a:t>cached</a:t>
+              <a:t>staged</a:t>
             </a:r>
             <a:endParaRPr lang="de-DE" dirty="0">
               <a:solidFill>
@@ -18528,7 +18562,7 @@
           <a:p>
             <a:fld id="{96FFDB0F-6330-4BF7-A014-223A941A9349}" type="datetime1">
               <a:rPr lang="de-DE" smtClean="0"/>
-              <a:t>20.10.2020</a:t>
+              <a:t>17.03.2021</a:t>
             </a:fld>
             <a:endParaRPr lang="de-DE"/>
           </a:p>
@@ -18558,7 +18592,13 @@
       </p:sp>
       <p:pic>
         <p:nvPicPr>
-          <p:cNvPr id="8" name="Grafik 7"/>
+          <p:cNvPr id="9" name="Grafik 8">
+            <a:extLst>
+              <a:ext uri="{FF2B5EF4-FFF2-40B4-BE49-F238E27FC236}">
+                <a16:creationId xmlns:a16="http://schemas.microsoft.com/office/drawing/2014/main" id="{19A1229E-774E-40C3-99AC-ACA4E6CB6C31}"/>
+              </a:ext>
+            </a:extLst>
+          </p:cNvPr>
           <p:cNvPicPr>
             <a:picLocks noChangeAspect="1"/>
           </p:cNvPicPr>
@@ -18572,8 +18612,8 @@
         </p:blipFill>
         <p:spPr>
           <a:xfrm>
-            <a:off x="4334376" y="3429000"/>
-            <a:ext cx="7017837" cy="2736850"/>
+            <a:off x="4721392" y="3428999"/>
+            <a:ext cx="6630821" cy="2736849"/>
           </a:xfrm>
           <a:prstGeom prst="rect">
             <a:avLst/>
@@ -18610,6 +18650,42 @@
           <a:chExt cx="0" cy="0"/>
         </a:xfrm>
       </p:grpSpPr>
+      <p:pic>
+        <p:nvPicPr>
+          <p:cNvPr id="8" name="Grafik 7">
+            <a:extLst>
+              <a:ext uri="{FF2B5EF4-FFF2-40B4-BE49-F238E27FC236}">
+                <a16:creationId xmlns:a16="http://schemas.microsoft.com/office/drawing/2014/main" id="{72D91706-0A17-4878-A999-78C2E9F89ABB}"/>
+              </a:ext>
+            </a:extLst>
+          </p:cNvPr>
+          <p:cNvPicPr>
+            <a:picLocks noChangeAspect="1"/>
+          </p:cNvPicPr>
+          <p:nvPr/>
+        </p:nvPicPr>
+        <p:blipFill>
+          <a:blip r:embed="rId3">
+            <a:extLst>
+              <a:ext uri="{28A0092B-C50C-407E-A947-70E740481C1C}">
+                <a14:useLocalDpi xmlns:a14="http://schemas.microsoft.com/office/drawing/2010/main" val="0"/>
+              </a:ext>
+            </a:extLst>
+          </a:blip>
+          <a:stretch>
+            <a:fillRect/>
+          </a:stretch>
+        </p:blipFill>
+        <p:spPr>
+          <a:xfrm>
+            <a:off x="6026453" y="2645664"/>
+            <a:ext cx="4325086" cy="3376714"/>
+          </a:xfrm>
+          <a:prstGeom prst="rect">
+            <a:avLst/>
+          </a:prstGeom>
+        </p:spPr>
+      </p:pic>
       <p:sp>
         <p:nvSpPr>
           <p:cNvPr id="2" name="Titel 1"/>
@@ -18735,7 +18811,7 @@
                 </a:solidFill>
                 <a:latin typeface="Source Code Pro" panose="020B0509030403020204" pitchFamily="49" charset="0"/>
               </a:rPr>
-              <a:t>cached</a:t>
+              <a:t>staged</a:t>
             </a:r>
             <a:endParaRPr lang="de-DE" dirty="0">
               <a:solidFill>
@@ -18786,7 +18862,7 @@
           <a:p>
             <a:fld id="{ACF60554-380E-4F1A-B12C-E6619A9B02B7}" type="datetime1">
               <a:rPr lang="de-DE" smtClean="0"/>
-              <a:t>20.10.2020</a:t>
+              <a:t>17.03.2021</a:t>
             </a:fld>
             <a:endParaRPr lang="de-DE"/>
           </a:p>
@@ -18814,30 +18890,6 @@
           </a:p>
         </p:txBody>
       </p:sp>
-      <p:pic>
-        <p:nvPicPr>
-          <p:cNvPr id="9" name="Grafik 8"/>
-          <p:cNvPicPr>
-            <a:picLocks noChangeAspect="1"/>
-          </p:cNvPicPr>
-          <p:nvPr/>
-        </p:nvPicPr>
-        <p:blipFill>
-          <a:blip r:embed="rId3"/>
-          <a:stretch>
-            <a:fillRect/>
-          </a:stretch>
-        </p:blipFill>
-        <p:spPr>
-          <a:xfrm>
-            <a:off x="6024563" y="2645664"/>
-            <a:ext cx="4326976" cy="3376714"/>
-          </a:xfrm>
-          <a:prstGeom prst="rect">
-            <a:avLst/>
-          </a:prstGeom>
-        </p:spPr>
-      </p:pic>
     </p:spTree>
     <p:extLst>
       <p:ext uri="{BB962C8B-B14F-4D97-AF65-F5344CB8AC3E}">
@@ -19127,7 +19179,7 @@
                 </a:solidFill>
                 <a:latin typeface="Source Code Pro" panose="020B0509030403020204" pitchFamily="49" charset="0"/>
               </a:rPr>
-              <a:t>cached</a:t>
+              <a:t>staged</a:t>
             </a:r>
             <a:endParaRPr lang="de-DE" dirty="0">
               <a:solidFill>
@@ -19158,7 +19210,7 @@
           <a:p>
             <a:fld id="{A15FEB95-FD04-4942-8AC0-4CEE8A1910E0}" type="datetime1">
               <a:rPr lang="de-DE" smtClean="0"/>
-              <a:t>20.10.2020</a:t>
+              <a:t>17.03.2021</a:t>
             </a:fld>
             <a:endParaRPr lang="de-DE"/>
           </a:p>
@@ -19361,7 +19413,7 @@
           <a:p>
             <a:fld id="{905C2294-F66B-458C-ACD1-310C3289A4D7}" type="datetime1">
               <a:rPr lang="de-DE" smtClean="0"/>
-              <a:t>20.10.2020</a:t>
+              <a:t>17.03.2021</a:t>
             </a:fld>
             <a:endParaRPr lang="de-DE"/>
           </a:p>
@@ -19478,7 +19530,7 @@
         <p:spPr>
           <a:xfrm>
             <a:off x="838200" y="1520825"/>
-            <a:ext cx="4929555" cy="4482042"/>
+            <a:ext cx="5430982" cy="4482042"/>
           </a:xfrm>
         </p:spPr>
         <p:txBody>
@@ -19525,24 +19577,7 @@
                 </a:solidFill>
                 <a:latin typeface="Source Code Pro" panose="020B0509030403020204" pitchFamily="49" charset="0"/>
               </a:rPr>
-              <a:t> </a:t>
-            </a:r>
-            <a:br>
-              <a:rPr lang="de-DE" dirty="0">
-                <a:solidFill>
-                  <a:srgbClr val="00B050"/>
-                </a:solidFill>
-                <a:latin typeface="Source Code Pro" panose="020B0509030403020204" pitchFamily="49" charset="0"/>
-              </a:rPr>
-            </a:br>
-            <a:r>
-              <a:rPr lang="de-DE" dirty="0">
-                <a:solidFill>
-                  <a:srgbClr val="00B050"/>
-                </a:solidFill>
-                <a:latin typeface="Source Code Pro" panose="020B0509030403020204" pitchFamily="49" charset="0"/>
-              </a:rPr>
-              <a:t>--</a:t>
+              <a:t> --</a:t>
             </a:r>
             <a:r>
               <a:rPr lang="de-DE" dirty="0" err="1">
@@ -19551,7 +19586,7 @@
                 </a:solidFill>
                 <a:latin typeface="Source Code Pro" panose="020B0509030403020204" pitchFamily="49" charset="0"/>
               </a:rPr>
-              <a:t>cached</a:t>
+              <a:t>staged</a:t>
             </a:r>
             <a:endParaRPr lang="de-DE" dirty="0"/>
           </a:p>
@@ -19600,7 +19635,7 @@
           <a:p>
             <a:fld id="{0B538DBD-9B9A-460D-A8F8-F5E24B6963FE}" type="datetime1">
               <a:rPr lang="de-DE" smtClean="0"/>
-              <a:t>20.10.2020</a:t>
+              <a:t>17.03.2021</a:t>
             </a:fld>
             <a:endParaRPr lang="de-DE"/>
           </a:p>
@@ -19630,7 +19665,13 @@
       </p:sp>
       <p:pic>
         <p:nvPicPr>
-          <p:cNvPr id="8" name="Grafik 7"/>
+          <p:cNvPr id="9" name="Grafik 8">
+            <a:extLst>
+              <a:ext uri="{FF2B5EF4-FFF2-40B4-BE49-F238E27FC236}">
+                <a16:creationId xmlns:a16="http://schemas.microsoft.com/office/drawing/2014/main" id="{B6262AF5-1ED7-4797-A1CF-4BBB5217D860}"/>
+              </a:ext>
+            </a:extLst>
+          </p:cNvPr>
           <p:cNvPicPr>
             <a:picLocks noChangeAspect="1"/>
           </p:cNvPicPr>
@@ -19644,8 +19685,8 @@
         </p:blipFill>
         <p:spPr>
           <a:xfrm>
-            <a:off x="4334376" y="3429001"/>
-            <a:ext cx="7017837" cy="2736850"/>
+            <a:off x="4721386" y="3428999"/>
+            <a:ext cx="6630828" cy="2736852"/>
           </a:xfrm>
           <a:prstGeom prst="rect">
             <a:avLst/>
@@ -21672,7 +21713,7 @@
           <a:p>
             <a:fld id="{63315D55-A135-41CD-B839-790578DB92DC}" type="datetime1">
               <a:rPr lang="de-DE" smtClean="0"/>
-              <a:t>20.10.2020</a:t>
+              <a:t>17.03.2021</a:t>
             </a:fld>
             <a:endParaRPr lang="de-DE"/>
           </a:p>
@@ -21819,7 +21860,7 @@
           <a:p>
             <a:fld id="{106E480B-E8B3-4967-B0D1-D2B098CD9A0F}" type="datetime1">
               <a:rPr lang="de-DE" smtClean="0"/>
-              <a:t>20.10.2020</a:t>
+              <a:t>17.03.2021</a:t>
             </a:fld>
             <a:endParaRPr lang="de-DE"/>
           </a:p>
@@ -21939,6 +21980,17 @@
           <a:lstStyle/>
           <a:p>
             <a:r>
+              <a:rPr lang="de-DE" dirty="0">
+                <a:solidFill>
+                  <a:srgbClr val="00B050"/>
+                </a:solidFill>
+                <a:latin typeface="Source Code Pro" panose="020B0509030403020204" pitchFamily="49" charset="0"/>
+              </a:rPr>
+              <a:t>echo "geändert" &gt; test.txt</a:t>
+            </a:r>
+          </a:p>
+          <a:p>
+            <a:r>
               <a:rPr lang="de-DE" dirty="0" err="1">
                 <a:solidFill>
                   <a:srgbClr val="00B050"/>
@@ -22016,7 +22068,7 @@
                 </a:solidFill>
                 <a:latin typeface="Source Code Pro" panose="020B0509030403020204" pitchFamily="49" charset="0"/>
               </a:rPr>
-              <a:t>cached</a:t>
+              <a:t>staged</a:t>
             </a:r>
             <a:endParaRPr lang="de-DE" dirty="0">
               <a:solidFill>
@@ -22047,7 +22099,7 @@
           <a:p>
             <a:fld id="{A15FEB95-FD04-4942-8AC0-4CEE8A1910E0}" type="datetime1">
               <a:rPr lang="de-DE" smtClean="0"/>
-              <a:t>20.10.2020</a:t>
+              <a:t>17.03.2021</a:t>
             </a:fld>
             <a:endParaRPr lang="de-DE"/>
           </a:p>
@@ -23091,7 +23143,7 @@
           <a:p>
             <a:fld id="{E237F9CC-7F00-4C34-B7F4-59FAEC5AA0E4}" type="datetime1">
               <a:rPr lang="de-DE" smtClean="0"/>
-              <a:t>20.10.2020</a:t>
+              <a:t>17.03.2021</a:t>
             </a:fld>
             <a:endParaRPr lang="de-DE"/>
           </a:p>
@@ -24002,7 +24054,7 @@
           <a:p>
             <a:fld id="{30B20133-1101-4E42-B535-7B8870005161}" type="datetime1">
               <a:rPr lang="de-DE" smtClean="0"/>
-              <a:t>20.10.2020</a:t>
+              <a:t>17.03.2021</a:t>
             </a:fld>
             <a:endParaRPr lang="de-DE"/>
           </a:p>
@@ -25080,7 +25132,7 @@
           <a:p>
             <a:fld id="{71080645-997B-4D5F-81EC-0D3336349B86}" type="datetime1">
               <a:rPr lang="de-DE" smtClean="0"/>
-              <a:t>20.10.2020</a:t>
+              <a:t>17.03.2021</a:t>
             </a:fld>
             <a:endParaRPr lang="de-DE"/>
           </a:p>
@@ -25328,7 +25380,7 @@
           <a:p>
             <a:fld id="{5204D92C-E271-44BC-8A68-B819743AB42A}" type="datetime1">
               <a:rPr lang="de-DE" smtClean="0"/>
-              <a:t>20.10.2020</a:t>
+              <a:t>17.03.2021</a:t>
             </a:fld>
             <a:endParaRPr lang="de-DE"/>
           </a:p>
@@ -25409,142 +25461,154 @@
           <a:chExt cx="0" cy="0"/>
         </a:xfrm>
       </p:grpSpPr>
+      <p:sp>
+        <p:nvSpPr>
+          <p:cNvPr id="2" name="Titel 1"/>
+          <p:cNvSpPr>
+            <a:spLocks noGrp="1"/>
+          </p:cNvSpPr>
+          <p:nvPr>
+            <p:ph type="title"/>
+          </p:nvPr>
+        </p:nvSpPr>
+        <p:spPr/>
+        <p:txBody>
+          <a:bodyPr/>
+          <a:lstStyle/>
+          <a:p>
+            <a:r>
+              <a:rPr lang="de-DE" dirty="0"/>
+              <a:t>Zusammenfassung</a:t>
+            </a:r>
+          </a:p>
+        </p:txBody>
+      </p:sp>
+      <p:sp>
+        <p:nvSpPr>
+          <p:cNvPr id="8" name="Inhaltsplatzhalter 7"/>
+          <p:cNvSpPr>
+            <a:spLocks noGrp="1"/>
+          </p:cNvSpPr>
+          <p:nvPr>
+            <p:ph idx="1"/>
+          </p:nvPr>
+        </p:nvSpPr>
+        <p:spPr/>
+        <p:txBody>
+          <a:bodyPr/>
+          <a:lstStyle/>
+          <a:p>
+            <a:r>
+              <a:rPr lang="de-DE" dirty="0"/>
+              <a:t>lokale Operationen</a:t>
+            </a:r>
+          </a:p>
+        </p:txBody>
+      </p:sp>
+      <p:sp>
+        <p:nvSpPr>
+          <p:cNvPr id="6" name="Datumsplatzhalter 5"/>
+          <p:cNvSpPr>
+            <a:spLocks noGrp="1"/>
+          </p:cNvSpPr>
+          <p:nvPr>
+            <p:ph type="dt" sz="half" idx="10"/>
+          </p:nvPr>
+        </p:nvSpPr>
+        <p:spPr/>
+        <p:txBody>
+          <a:bodyPr/>
+          <a:lstStyle/>
+          <a:p>
+            <a:fld id="{F6230CE0-69B9-4D76-AF88-27BF35D25B97}" type="datetime1">
+              <a:rPr lang="de-DE" smtClean="0"/>
+              <a:t>17.03.2021</a:t>
+            </a:fld>
+            <a:endParaRPr lang="de-DE"/>
+          </a:p>
+        </p:txBody>
+      </p:sp>
+      <p:sp>
+        <p:nvSpPr>
+          <p:cNvPr id="7" name="Fußzeilenplatzhalter 6"/>
+          <p:cNvSpPr>
+            <a:spLocks noGrp="1"/>
+          </p:cNvSpPr>
+          <p:nvPr>
+            <p:ph type="ftr" sz="quarter" idx="11"/>
+          </p:nvPr>
+        </p:nvSpPr>
+        <p:spPr/>
+        <p:txBody>
+          <a:bodyPr/>
+          <a:lstStyle/>
+          <a:p>
+            <a:r>
+              <a:rPr lang="de-DE"/>
+              <a:t>Git Grundlagen</a:t>
+            </a:r>
+          </a:p>
+        </p:txBody>
+      </p:sp>
+      <p:sp>
+        <p:nvSpPr>
+          <p:cNvPr id="4" name="Foliennummernplatzhalter 3"/>
+          <p:cNvSpPr>
+            <a:spLocks noGrp="1"/>
+          </p:cNvSpPr>
+          <p:nvPr>
+            <p:ph type="sldNum" sz="quarter" idx="12"/>
+          </p:nvPr>
+        </p:nvSpPr>
+        <p:spPr/>
+        <p:txBody>
+          <a:bodyPr/>
+          <a:lstStyle/>
+          <a:p>
+            <a:fld id="{AB458CDC-F811-4EB3-BCC2-BC6A7985F2E8}" type="slidenum">
+              <a:rPr lang="de-DE" smtClean="0"/>
+              <a:t>46</a:t>
+            </a:fld>
+            <a:endParaRPr lang="de-DE"/>
+          </a:p>
+        </p:txBody>
+      </p:sp>
       <p:pic>
         <p:nvPicPr>
-          <p:cNvPr id="5" name="Grafik 4"/>
+          <p:cNvPr id="9" name="Grafik 8">
+            <a:extLst>
+              <a:ext uri="{FF2B5EF4-FFF2-40B4-BE49-F238E27FC236}">
+                <a16:creationId xmlns:a16="http://schemas.microsoft.com/office/drawing/2014/main" id="{ADF51018-23E0-47D4-9D8A-A4D3F34A337F}"/>
+              </a:ext>
+            </a:extLst>
+          </p:cNvPr>
           <p:cNvPicPr>
             <a:picLocks noChangeAspect="1"/>
           </p:cNvPicPr>
           <p:nvPr/>
         </p:nvPicPr>
         <p:blipFill>
-          <a:blip r:embed="rId3"/>
+          <a:blip r:embed="rId3">
+            <a:extLst>
+              <a:ext uri="{28A0092B-C50C-407E-A947-70E740481C1C}">
+                <a14:useLocalDpi xmlns:a14="http://schemas.microsoft.com/office/drawing/2010/main" val="0"/>
+              </a:ext>
+            </a:extLst>
+          </a:blip>
           <a:stretch>
             <a:fillRect/>
           </a:stretch>
         </p:blipFill>
         <p:spPr>
           <a:xfrm>
-            <a:off x="1676555" y="1520825"/>
-            <a:ext cx="9676451" cy="4645025"/>
+            <a:off x="2016807" y="1520825"/>
+            <a:ext cx="8950741" cy="4645025"/>
           </a:xfrm>
           <a:prstGeom prst="rect">
             <a:avLst/>
           </a:prstGeom>
         </p:spPr>
       </p:pic>
-      <p:sp>
-        <p:nvSpPr>
-          <p:cNvPr id="2" name="Titel 1"/>
-          <p:cNvSpPr>
-            <a:spLocks noGrp="1"/>
-          </p:cNvSpPr>
-          <p:nvPr>
-            <p:ph type="title"/>
-          </p:nvPr>
-        </p:nvSpPr>
-        <p:spPr/>
-        <p:txBody>
-          <a:bodyPr/>
-          <a:lstStyle/>
-          <a:p>
-            <a:r>
-              <a:rPr lang="de-DE" dirty="0"/>
-              <a:t>Zusammenfassung</a:t>
-            </a:r>
-          </a:p>
-        </p:txBody>
-      </p:sp>
-      <p:sp>
-        <p:nvSpPr>
-          <p:cNvPr id="8" name="Inhaltsplatzhalter 7"/>
-          <p:cNvSpPr>
-            <a:spLocks noGrp="1"/>
-          </p:cNvSpPr>
-          <p:nvPr>
-            <p:ph idx="1"/>
-          </p:nvPr>
-        </p:nvSpPr>
-        <p:spPr/>
-        <p:txBody>
-          <a:bodyPr/>
-          <a:lstStyle/>
-          <a:p>
-            <a:r>
-              <a:rPr lang="de-DE" dirty="0"/>
-              <a:t>lokale Operationen</a:t>
-            </a:r>
-          </a:p>
-        </p:txBody>
-      </p:sp>
-      <p:sp>
-        <p:nvSpPr>
-          <p:cNvPr id="6" name="Datumsplatzhalter 5"/>
-          <p:cNvSpPr>
-            <a:spLocks noGrp="1"/>
-          </p:cNvSpPr>
-          <p:nvPr>
-            <p:ph type="dt" sz="half" idx="10"/>
-          </p:nvPr>
-        </p:nvSpPr>
-        <p:spPr/>
-        <p:txBody>
-          <a:bodyPr/>
-          <a:lstStyle/>
-          <a:p>
-            <a:fld id="{F6230CE0-69B9-4D76-AF88-27BF35D25B97}" type="datetime1">
-              <a:rPr lang="de-DE" smtClean="0"/>
-              <a:t>20.10.2020</a:t>
-            </a:fld>
-            <a:endParaRPr lang="de-DE"/>
-          </a:p>
-        </p:txBody>
-      </p:sp>
-      <p:sp>
-        <p:nvSpPr>
-          <p:cNvPr id="7" name="Fußzeilenplatzhalter 6"/>
-          <p:cNvSpPr>
-            <a:spLocks noGrp="1"/>
-          </p:cNvSpPr>
-          <p:nvPr>
-            <p:ph type="ftr" sz="quarter" idx="11"/>
-          </p:nvPr>
-        </p:nvSpPr>
-        <p:spPr/>
-        <p:txBody>
-          <a:bodyPr/>
-          <a:lstStyle/>
-          <a:p>
-            <a:r>
-              <a:rPr lang="de-DE"/>
-              <a:t>Git Grundlagen</a:t>
-            </a:r>
-          </a:p>
-        </p:txBody>
-      </p:sp>
-      <p:sp>
-        <p:nvSpPr>
-          <p:cNvPr id="4" name="Foliennummernplatzhalter 3"/>
-          <p:cNvSpPr>
-            <a:spLocks noGrp="1"/>
-          </p:cNvSpPr>
-          <p:nvPr>
-            <p:ph type="sldNum" sz="quarter" idx="12"/>
-          </p:nvPr>
-        </p:nvSpPr>
-        <p:spPr/>
-        <p:txBody>
-          <a:bodyPr/>
-          <a:lstStyle/>
-          <a:p>
-            <a:fld id="{AB458CDC-F811-4EB3-BCC2-BC6A7985F2E8}" type="slidenum">
-              <a:rPr lang="de-DE" smtClean="0"/>
-              <a:t>46</a:t>
-            </a:fld>
-            <a:endParaRPr lang="de-DE"/>
-          </a:p>
-        </p:txBody>
-      </p:sp>
     </p:spTree>
     <p:extLst>
       <p:ext uri="{BB962C8B-B14F-4D97-AF65-F5344CB8AC3E}">
@@ -25889,7 +25953,7 @@
           <a:p>
             <a:fld id="{2E866B80-6830-40EC-A3C6-8B4D98376932}" type="datetime1">
               <a:rPr lang="de-DE" smtClean="0"/>
-              <a:t>20.10.2020</a:t>
+              <a:t>17.03.2021</a:t>
             </a:fld>
             <a:endParaRPr lang="de-DE"/>
           </a:p>
@@ -26129,7 +26193,7 @@
           <a:p>
             <a:fld id="{55CF7B08-6172-4F18-B301-458977AB4D4C}" type="datetime1">
               <a:rPr lang="de-DE" smtClean="0"/>
-              <a:t>20.10.2020</a:t>
+              <a:t>17.03.2021</a:t>
             </a:fld>
             <a:endParaRPr lang="de-DE"/>
           </a:p>
@@ -26249,7 +26313,7 @@
           <a:p>
             <a:fld id="{A51A7FC6-678B-440F-B5A1-922EBC98B3DE}" type="datetime1">
               <a:rPr lang="de-DE" smtClean="0"/>
-              <a:t>20.10.2020</a:t>
+              <a:t>17.03.2021</a:t>
             </a:fld>
             <a:endParaRPr lang="de-DE"/>
           </a:p>
@@ -27375,7 +27439,7 @@
           <a:p>
             <a:fld id="{FF37563B-9684-4736-AD9B-8754054AFBF5}" type="datetime1">
               <a:rPr lang="de-DE" smtClean="0"/>
-              <a:t>20.10.2020</a:t>
+              <a:t>17.03.2021</a:t>
             </a:fld>
             <a:endParaRPr lang="de-DE"/>
           </a:p>
@@ -27585,7 +27649,7 @@
           <a:p>
             <a:fld id="{FBFEF233-C0B8-4E81-9647-062C3D3D3715}" type="datetime1">
               <a:rPr lang="de-DE" smtClean="0"/>
-              <a:t>20.10.2020</a:t>
+              <a:t>17.03.2021</a:t>
             </a:fld>
             <a:endParaRPr lang="de-DE"/>
           </a:p>
@@ -28068,7 +28132,7 @@
           <a:p>
             <a:fld id="{FBFEF233-C0B8-4E81-9647-062C3D3D3715}" type="datetime1">
               <a:rPr lang="de-DE" smtClean="0"/>
-              <a:t>20.10.2020</a:t>
+              <a:t>17.03.2021</a:t>
             </a:fld>
             <a:endParaRPr lang="de-DE"/>
           </a:p>
@@ -28197,7 +28261,7 @@
           <a:p>
             <a:fld id="{B355EDB0-77CD-4224-B690-72579E113DA5}" type="datetime1">
               <a:rPr lang="de-DE" smtClean="0"/>
-              <a:t>20.10.2020</a:t>
+              <a:t>17.03.2021</a:t>
             </a:fld>
             <a:endParaRPr lang="de-DE"/>
           </a:p>
@@ -28404,7 +28468,7 @@
           <a:p>
             <a:fld id="{FBFEF233-C0B8-4E81-9647-062C3D3D3715}" type="datetime1">
               <a:rPr lang="de-DE" smtClean="0"/>
-              <a:t>20.10.2020</a:t>
+              <a:t>17.03.2021</a:t>
             </a:fld>
             <a:endParaRPr lang="de-DE"/>
           </a:p>

</xml_diff>